<commit_message>
Added definition of done
</commit_message>
<xml_diff>
--- a/group_info/demo-group_a_14_1.pptx
+++ b/group_info/demo-group_a_14_1.pptx
@@ -8,25 +8,26 @@
     <p:sldId id="256" r:id="rId2"/>
     <p:sldId id="257" r:id="rId3"/>
     <p:sldId id="262" r:id="rId4"/>
-    <p:sldId id="271" r:id="rId5"/>
-    <p:sldId id="272" r:id="rId6"/>
-    <p:sldId id="283" r:id="rId7"/>
-    <p:sldId id="275" r:id="rId8"/>
-    <p:sldId id="276" r:id="rId9"/>
-    <p:sldId id="277" r:id="rId10"/>
-    <p:sldId id="265" r:id="rId11"/>
-    <p:sldId id="274" r:id="rId12"/>
-    <p:sldId id="278" r:id="rId13"/>
-    <p:sldId id="279" r:id="rId14"/>
-    <p:sldId id="280" r:id="rId15"/>
-    <p:sldId id="281" r:id="rId16"/>
-    <p:sldId id="282" r:id="rId17"/>
-    <p:sldId id="286" r:id="rId18"/>
-    <p:sldId id="285" r:id="rId19"/>
-    <p:sldId id="284" r:id="rId20"/>
-    <p:sldId id="258" r:id="rId21"/>
-    <p:sldId id="260" r:id="rId22"/>
-    <p:sldId id="270" r:id="rId23"/>
+    <p:sldId id="287" r:id="rId5"/>
+    <p:sldId id="271" r:id="rId6"/>
+    <p:sldId id="272" r:id="rId7"/>
+    <p:sldId id="283" r:id="rId8"/>
+    <p:sldId id="275" r:id="rId9"/>
+    <p:sldId id="276" r:id="rId10"/>
+    <p:sldId id="277" r:id="rId11"/>
+    <p:sldId id="265" r:id="rId12"/>
+    <p:sldId id="274" r:id="rId13"/>
+    <p:sldId id="278" r:id="rId14"/>
+    <p:sldId id="279" r:id="rId15"/>
+    <p:sldId id="280" r:id="rId16"/>
+    <p:sldId id="281" r:id="rId17"/>
+    <p:sldId id="282" r:id="rId18"/>
+    <p:sldId id="286" r:id="rId19"/>
+    <p:sldId id="285" r:id="rId20"/>
+    <p:sldId id="284" r:id="rId21"/>
+    <p:sldId id="258" r:id="rId22"/>
+    <p:sldId id="260" r:id="rId23"/>
+    <p:sldId id="270" r:id="rId24"/>
   </p:sldIdLst>
   <p:sldSz cx="12192000" cy="6858000"/>
   <p:notesSz cx="6858000" cy="9144000"/>
@@ -9333,6 +9334,66 @@
 <file path=ppt/slides/slide10.xml><?xml version="1.0" encoding="utf-8"?>
 <p:sld xmlns:a="http://schemas.openxmlformats.org/drawingml/2006/main" xmlns:r="http://schemas.openxmlformats.org/officeDocument/2006/relationships" xmlns:p="http://schemas.openxmlformats.org/presentationml/2006/main">
   <p:cSld>
+    <p:spTree>
+      <p:nvGrpSpPr>
+        <p:cNvPr id="1" name=""/>
+        <p:cNvGrpSpPr/>
+        <p:nvPr/>
+      </p:nvGrpSpPr>
+      <p:grpSpPr>
+        <a:xfrm>
+          <a:off x="0" y="0"/>
+          <a:ext cx="0" cy="0"/>
+          <a:chOff x="0" y="0"/>
+          <a:chExt cx="0" cy="0"/>
+        </a:xfrm>
+      </p:grpSpPr>
+      <p:pic>
+        <p:nvPicPr>
+          <p:cNvPr id="3" name="Immagine 2">
+            <a:extLst>
+              <a:ext uri="{FF2B5EF4-FFF2-40B4-BE49-F238E27FC236}">
+                <a16:creationId xmlns:a16="http://schemas.microsoft.com/office/drawing/2014/main" id="{1DAF4443-9696-41FF-9D84-4079CFCEFB3B}"/>
+              </a:ext>
+            </a:extLst>
+          </p:cNvPr>
+          <p:cNvPicPr>
+            <a:picLocks noChangeAspect="1"/>
+          </p:cNvPicPr>
+          <p:nvPr/>
+        </p:nvPicPr>
+        <p:blipFill>
+          <a:blip r:embed="rId2"/>
+          <a:stretch>
+            <a:fillRect/>
+          </a:stretch>
+        </p:blipFill>
+        <p:spPr>
+          <a:xfrm>
+            <a:off x="845533" y="2250458"/>
+            <a:ext cx="10500934" cy="2357083"/>
+          </a:xfrm>
+          <a:prstGeom prst="rect">
+            <a:avLst/>
+          </a:prstGeom>
+        </p:spPr>
+      </p:pic>
+    </p:spTree>
+    <p:extLst>
+      <p:ext uri="{BB962C8B-B14F-4D97-AF65-F5344CB8AC3E}">
+        <p14:creationId xmlns:p14="http://schemas.microsoft.com/office/powerpoint/2010/main" val="515914171"/>
+      </p:ext>
+    </p:extLst>
+  </p:cSld>
+  <p:clrMapOvr>
+    <a:masterClrMapping/>
+  </p:clrMapOvr>
+</p:sld>
+</file>
+
+<file path=ppt/slides/slide11.xml><?xml version="1.0" encoding="utf-8"?>
+<p:sld xmlns:a="http://schemas.openxmlformats.org/drawingml/2006/main" xmlns:r="http://schemas.openxmlformats.org/officeDocument/2006/relationships" xmlns:p="http://schemas.openxmlformats.org/presentationml/2006/main">
+  <p:cSld>
     <p:bg>
       <p:bgPr>
         <a:blipFill rotWithShape="1">
@@ -9530,7 +9591,7 @@
 </p:sld>
 </file>
 
-<file path=ppt/slides/slide11.xml><?xml version="1.0" encoding="utf-8"?>
+<file path=ppt/slides/slide12.xml><?xml version="1.0" encoding="utf-8"?>
 <p:sld xmlns:a="http://schemas.openxmlformats.org/drawingml/2006/main" xmlns:r="http://schemas.openxmlformats.org/officeDocument/2006/relationships" xmlns:p="http://schemas.openxmlformats.org/presentationml/2006/main">
   <p:cSld>
     <p:spTree>
@@ -9590,7 +9651,7 @@
 </p:sld>
 </file>
 
-<file path=ppt/slides/slide12.xml><?xml version="1.0" encoding="utf-8"?>
+<file path=ppt/slides/slide13.xml><?xml version="1.0" encoding="utf-8"?>
 <p:sld xmlns:a="http://schemas.openxmlformats.org/drawingml/2006/main" xmlns:r="http://schemas.openxmlformats.org/officeDocument/2006/relationships" xmlns:p="http://schemas.openxmlformats.org/presentationml/2006/main">
   <p:cSld>
     <p:spTree>
@@ -9650,7 +9711,7 @@
 </p:sld>
 </file>
 
-<file path=ppt/slides/slide13.xml><?xml version="1.0" encoding="utf-8"?>
+<file path=ppt/slides/slide14.xml><?xml version="1.0" encoding="utf-8"?>
 <p:sld xmlns:a="http://schemas.openxmlformats.org/drawingml/2006/main" xmlns:r="http://schemas.openxmlformats.org/officeDocument/2006/relationships" xmlns:p="http://schemas.openxmlformats.org/presentationml/2006/main">
   <p:cSld>
     <p:spTree>
@@ -9710,7 +9771,7 @@
 </p:sld>
 </file>
 
-<file path=ppt/slides/slide14.xml><?xml version="1.0" encoding="utf-8"?>
+<file path=ppt/slides/slide15.xml><?xml version="1.0" encoding="utf-8"?>
 <p:sld xmlns:a="http://schemas.openxmlformats.org/drawingml/2006/main" xmlns:r="http://schemas.openxmlformats.org/officeDocument/2006/relationships" xmlns:p="http://schemas.openxmlformats.org/presentationml/2006/main">
   <p:cSld>
     <p:spTree>
@@ -9770,7 +9831,7 @@
 </p:sld>
 </file>
 
-<file path=ppt/slides/slide15.xml><?xml version="1.0" encoding="utf-8"?>
+<file path=ppt/slides/slide16.xml><?xml version="1.0" encoding="utf-8"?>
 <p:sld xmlns:a="http://schemas.openxmlformats.org/drawingml/2006/main" xmlns:r="http://schemas.openxmlformats.org/officeDocument/2006/relationships" xmlns:p="http://schemas.openxmlformats.org/presentationml/2006/main">
   <p:cSld>
     <p:spTree>
@@ -9830,7 +9891,7 @@
 </p:sld>
 </file>
 
-<file path=ppt/slides/slide16.xml><?xml version="1.0" encoding="utf-8"?>
+<file path=ppt/slides/slide17.xml><?xml version="1.0" encoding="utf-8"?>
 <p:sld xmlns:a="http://schemas.openxmlformats.org/drawingml/2006/main" xmlns:r="http://schemas.openxmlformats.org/officeDocument/2006/relationships" xmlns:p="http://schemas.openxmlformats.org/presentationml/2006/main">
   <p:cSld>
     <p:spTree>
@@ -9890,7 +9951,7 @@
 </p:sld>
 </file>
 
-<file path=ppt/slides/slide17.xml><?xml version="1.0" encoding="utf-8"?>
+<file path=ppt/slides/slide18.xml><?xml version="1.0" encoding="utf-8"?>
 <p:sld xmlns:a="http://schemas.openxmlformats.org/drawingml/2006/main" xmlns:r="http://schemas.openxmlformats.org/officeDocument/2006/relationships" xmlns:p="http://schemas.openxmlformats.org/presentationml/2006/main">
   <p:cSld>
     <p:spTree>
@@ -9949,7 +10010,7 @@
 </p:sld>
 </file>
 
-<file path=ppt/slides/slide18.xml><?xml version="1.0" encoding="utf-8"?>
+<file path=ppt/slides/slide19.xml><?xml version="1.0" encoding="utf-8"?>
 <p:sld xmlns:a="http://schemas.openxmlformats.org/drawingml/2006/main" xmlns:r="http://schemas.openxmlformats.org/officeDocument/2006/relationships" xmlns:p="http://schemas.openxmlformats.org/presentationml/2006/main">
   <p:cSld>
     <p:spTree>
@@ -10008,7 +10069,96 @@
 </p:sld>
 </file>
 
-<file path=ppt/slides/slide19.xml><?xml version="1.0" encoding="utf-8"?>
+<file path=ppt/slides/slide2.xml><?xml version="1.0" encoding="utf-8"?>
+<p:sld xmlns:a="http://schemas.openxmlformats.org/drawingml/2006/main" xmlns:r="http://schemas.openxmlformats.org/officeDocument/2006/relationships" xmlns:p="http://schemas.openxmlformats.org/presentationml/2006/main">
+  <p:cSld>
+    <p:spTree>
+      <p:nvGrpSpPr>
+        <p:cNvPr id="1" name=""/>
+        <p:cNvGrpSpPr/>
+        <p:nvPr/>
+      </p:nvGrpSpPr>
+      <p:grpSpPr>
+        <a:xfrm>
+          <a:off x="0" y="0"/>
+          <a:ext cx="0" cy="0"/>
+          <a:chOff x="0" y="0"/>
+          <a:chExt cx="0" cy="0"/>
+        </a:xfrm>
+      </p:grpSpPr>
+      <p:sp>
+        <p:nvSpPr>
+          <p:cNvPr id="2" name="Titolo 1">
+            <a:extLst>
+              <a:ext uri="{FF2B5EF4-FFF2-40B4-BE49-F238E27FC236}">
+                <a16:creationId xmlns:a16="http://schemas.microsoft.com/office/drawing/2014/main" id="{7ED690D3-0688-44D4-82A8-ACA6F6B4A0AC}"/>
+              </a:ext>
+            </a:extLst>
+          </p:cNvPr>
+          <p:cNvSpPr>
+            <a:spLocks noGrp="1"/>
+          </p:cNvSpPr>
+          <p:nvPr>
+            <p:ph type="title"/>
+          </p:nvPr>
+        </p:nvSpPr>
+        <p:spPr/>
+        <p:txBody>
+          <a:bodyPr/>
+          <a:lstStyle/>
+          <a:p>
+            <a:r>
+              <a:rPr lang="it-IT" dirty="0"/>
+              <a:t>Sprint 17/12/19 – 14/12/19</a:t>
+            </a:r>
+          </a:p>
+        </p:txBody>
+      </p:sp>
+      <p:graphicFrame>
+        <p:nvGraphicFramePr>
+          <p:cNvPr id="6" name="Segnaposto contenuto 5">
+            <a:extLst>
+              <a:ext uri="{FF2B5EF4-FFF2-40B4-BE49-F238E27FC236}">
+                <a16:creationId xmlns:a16="http://schemas.microsoft.com/office/drawing/2014/main" id="{5740335F-D312-4211-ADA2-5B337B81C6B4}"/>
+              </a:ext>
+            </a:extLst>
+          </p:cNvPr>
+          <p:cNvGraphicFramePr>
+            <a:graphicFrameLocks noGrp="1"/>
+          </p:cNvGraphicFramePr>
+          <p:nvPr>
+            <p:ph idx="1"/>
+            <p:extLst>
+              <p:ext uri="{D42A27DB-BD31-4B8C-83A1-F6EECF244321}">
+                <p14:modId xmlns:p14="http://schemas.microsoft.com/office/powerpoint/2010/main" val="1610127498"/>
+              </p:ext>
+            </p:extLst>
+          </p:nvPr>
+        </p:nvGraphicFramePr>
+        <p:xfrm>
+          <a:off x="1103313" y="1702191"/>
+          <a:ext cx="9264576" cy="4546209"/>
+        </p:xfrm>
+        <a:graphic>
+          <a:graphicData uri="http://schemas.openxmlformats.org/drawingml/2006/chart">
+            <c:chart xmlns:c="http://schemas.openxmlformats.org/drawingml/2006/chart" xmlns:r="http://schemas.openxmlformats.org/officeDocument/2006/relationships" r:id="rId2"/>
+          </a:graphicData>
+        </a:graphic>
+      </p:graphicFrame>
+    </p:spTree>
+    <p:extLst>
+      <p:ext uri="{BB962C8B-B14F-4D97-AF65-F5344CB8AC3E}">
+        <p14:creationId xmlns:p14="http://schemas.microsoft.com/office/powerpoint/2010/main" val="1339738920"/>
+      </p:ext>
+    </p:extLst>
+  </p:cSld>
+  <p:clrMapOvr>
+    <a:masterClrMapping/>
+  </p:clrMapOvr>
+</p:sld>
+</file>
+
+<file path=ppt/slides/slide20.xml><?xml version="1.0" encoding="utf-8"?>
 <p:sld xmlns:a="http://schemas.openxmlformats.org/drawingml/2006/main" xmlns:r="http://schemas.openxmlformats.org/officeDocument/2006/relationships" xmlns:p="http://schemas.openxmlformats.org/presentationml/2006/main">
   <p:cSld>
     <p:spTree>
@@ -10067,96 +10217,7 @@
 </p:sld>
 </file>
 
-<file path=ppt/slides/slide2.xml><?xml version="1.0" encoding="utf-8"?>
-<p:sld xmlns:a="http://schemas.openxmlformats.org/drawingml/2006/main" xmlns:r="http://schemas.openxmlformats.org/officeDocument/2006/relationships" xmlns:p="http://schemas.openxmlformats.org/presentationml/2006/main">
-  <p:cSld>
-    <p:spTree>
-      <p:nvGrpSpPr>
-        <p:cNvPr id="1" name=""/>
-        <p:cNvGrpSpPr/>
-        <p:nvPr/>
-      </p:nvGrpSpPr>
-      <p:grpSpPr>
-        <a:xfrm>
-          <a:off x="0" y="0"/>
-          <a:ext cx="0" cy="0"/>
-          <a:chOff x="0" y="0"/>
-          <a:chExt cx="0" cy="0"/>
-        </a:xfrm>
-      </p:grpSpPr>
-      <p:sp>
-        <p:nvSpPr>
-          <p:cNvPr id="2" name="Titolo 1">
-            <a:extLst>
-              <a:ext uri="{FF2B5EF4-FFF2-40B4-BE49-F238E27FC236}">
-                <a16:creationId xmlns:a16="http://schemas.microsoft.com/office/drawing/2014/main" id="{7ED690D3-0688-44D4-82A8-ACA6F6B4A0AC}"/>
-              </a:ext>
-            </a:extLst>
-          </p:cNvPr>
-          <p:cNvSpPr>
-            <a:spLocks noGrp="1"/>
-          </p:cNvSpPr>
-          <p:nvPr>
-            <p:ph type="title"/>
-          </p:nvPr>
-        </p:nvSpPr>
-        <p:spPr/>
-        <p:txBody>
-          <a:bodyPr/>
-          <a:lstStyle/>
-          <a:p>
-            <a:r>
-              <a:rPr lang="it-IT" dirty="0"/>
-              <a:t>Sprint 17/12/19 – 14/12/19</a:t>
-            </a:r>
-          </a:p>
-        </p:txBody>
-      </p:sp>
-      <p:graphicFrame>
-        <p:nvGraphicFramePr>
-          <p:cNvPr id="6" name="Segnaposto contenuto 5">
-            <a:extLst>
-              <a:ext uri="{FF2B5EF4-FFF2-40B4-BE49-F238E27FC236}">
-                <a16:creationId xmlns:a16="http://schemas.microsoft.com/office/drawing/2014/main" id="{5740335F-D312-4211-ADA2-5B337B81C6B4}"/>
-              </a:ext>
-            </a:extLst>
-          </p:cNvPr>
-          <p:cNvGraphicFramePr>
-            <a:graphicFrameLocks noGrp="1"/>
-          </p:cNvGraphicFramePr>
-          <p:nvPr>
-            <p:ph idx="1"/>
-            <p:extLst>
-              <p:ext uri="{D42A27DB-BD31-4B8C-83A1-F6EECF244321}">
-                <p14:modId xmlns:p14="http://schemas.microsoft.com/office/powerpoint/2010/main" val="1610127498"/>
-              </p:ext>
-            </p:extLst>
-          </p:nvPr>
-        </p:nvGraphicFramePr>
-        <p:xfrm>
-          <a:off x="1103313" y="1702191"/>
-          <a:ext cx="9264576" cy="4546209"/>
-        </p:xfrm>
-        <a:graphic>
-          <a:graphicData uri="http://schemas.openxmlformats.org/drawingml/2006/chart">
-            <c:chart xmlns:c="http://schemas.openxmlformats.org/drawingml/2006/chart" xmlns:r="http://schemas.openxmlformats.org/officeDocument/2006/relationships" r:id="rId2"/>
-          </a:graphicData>
-        </a:graphic>
-      </p:graphicFrame>
-    </p:spTree>
-    <p:extLst>
-      <p:ext uri="{BB962C8B-B14F-4D97-AF65-F5344CB8AC3E}">
-        <p14:creationId xmlns:p14="http://schemas.microsoft.com/office/powerpoint/2010/main" val="1339738920"/>
-      </p:ext>
-    </p:extLst>
-  </p:cSld>
-  <p:clrMapOvr>
-    <a:masterClrMapping/>
-  </p:clrMapOvr>
-</p:sld>
-</file>
-
-<file path=ppt/slides/slide20.xml><?xml version="1.0" encoding="utf-8"?>
+<file path=ppt/slides/slide21.xml><?xml version="1.0" encoding="utf-8"?>
 <p:sld xmlns:a="http://schemas.openxmlformats.org/drawingml/2006/main" xmlns:r="http://schemas.openxmlformats.org/officeDocument/2006/relationships" xmlns:p="http://schemas.openxmlformats.org/presentationml/2006/main">
   <p:cSld>
     <p:bg>
@@ -11244,7 +11305,7 @@
 </p:sld>
 </file>
 
-<file path=ppt/slides/slide21.xml><?xml version="1.0" encoding="utf-8"?>
+<file path=ppt/slides/slide22.xml><?xml version="1.0" encoding="utf-8"?>
 <p:sld xmlns:a="http://schemas.openxmlformats.org/drawingml/2006/main" xmlns:r="http://schemas.openxmlformats.org/officeDocument/2006/relationships" xmlns:p="http://schemas.openxmlformats.org/presentationml/2006/main">
   <p:cSld>
     <p:spTree>
@@ -11370,7 +11431,7 @@
 </p:sld>
 </file>
 
-<file path=ppt/slides/slide22.xml><?xml version="1.0" encoding="utf-8"?>
+<file path=ppt/slides/slide23.xml><?xml version="1.0" encoding="utf-8"?>
 <p:sld xmlns:a="http://schemas.openxmlformats.org/drawingml/2006/main" xmlns:r="http://schemas.openxmlformats.org/officeDocument/2006/relationships" xmlns:p="http://schemas.openxmlformats.org/presentationml/2006/main">
   <p:cSld>
     <p:spTree>
@@ -11676,30 +11737,6 @@
 <file path=ppt/slides/slide4.xml><?xml version="1.0" encoding="utf-8"?>
 <p:sld xmlns:a="http://schemas.openxmlformats.org/drawingml/2006/main" xmlns:r="http://schemas.openxmlformats.org/officeDocument/2006/relationships" xmlns:p="http://schemas.openxmlformats.org/presentationml/2006/main">
   <p:cSld>
-    <p:bg>
-      <p:bgPr>
-        <a:blipFill rotWithShape="1">
-          <a:blip r:embed="rId2">
-            <a:duotone>
-              <a:schemeClr val="bg2">
-                <a:shade val="69000"/>
-                <a:hueMod val="108000"/>
-                <a:satMod val="164000"/>
-                <a:lumMod val="74000"/>
-              </a:schemeClr>
-              <a:schemeClr val="bg2">
-                <a:tint val="96000"/>
-                <a:hueMod val="88000"/>
-                <a:satMod val="140000"/>
-                <a:lumMod val="132000"/>
-              </a:schemeClr>
-            </a:duotone>
-          </a:blip>
-          <a:stretch/>
-        </a:blipFill>
-        <a:effectLst/>
-      </p:bgPr>
-    </p:bg>
     <p:spTree>
       <p:nvGrpSpPr>
         <p:cNvPr id="1" name=""/>
@@ -11716,154 +11753,242 @@
       </p:grpSpPr>
       <p:sp>
         <p:nvSpPr>
-          <p:cNvPr id="8" name="Rectangle 7">
+          <p:cNvPr id="2" name="Titolo 1">
             <a:extLst>
               <a:ext uri="{FF2B5EF4-FFF2-40B4-BE49-F238E27FC236}">
-                <a16:creationId xmlns:a16="http://schemas.microsoft.com/office/drawing/2014/main" id="{DFB3CEA1-88D9-42FB-88ED-1E9807FE6596}"/>
-              </a:ext>
-              <a:ext uri="{C183D7F6-B498-43B3-948B-1728B52AA6E4}">
-                <adec:decorative xmlns:adec="http://schemas.microsoft.com/office/drawing/2017/decorative" val="1"/>
+                <a16:creationId xmlns:a16="http://schemas.microsoft.com/office/drawing/2014/main" id="{40EA9973-E061-4066-8F4B-EFDFBA35B8E5}"/>
               </a:ext>
             </a:extLst>
           </p:cNvPr>
           <p:cNvSpPr>
-            <a:spLocks noGrp="1" noRot="1" noChangeAspect="1" noMove="1" noResize="1" noEditPoints="1" noAdjustHandles="1" noChangeArrowheads="1" noChangeShapeType="1" noTextEdit="1"/>
-          </p:cNvSpPr>
-          <p:nvPr>
-            <p:extLst>
-              <p:ext uri="{386F3935-93C4-4BCD-93E2-E3B085C9AB24}">
-                <p16:designElem xmlns:p16="http://schemas.microsoft.com/office/powerpoint/2015/main" val="1"/>
-              </p:ext>
-            </p:extLst>
+            <a:spLocks noGrp="1"/>
+          </p:cNvSpPr>
+          <p:nvPr>
+            <p:ph type="title"/>
           </p:nvPr>
         </p:nvSpPr>
         <p:spPr>
           <a:xfrm>
-            <a:off x="477012" y="480060"/>
-            <a:ext cx="11237976" cy="5897880"/>
+            <a:off x="646111" y="452718"/>
+            <a:ext cx="9404723" cy="1400530"/>
           </a:xfrm>
-          <a:prstGeom prst="rect">
-            <a:avLst/>
-          </a:prstGeom>
-          <a:solidFill>
-            <a:srgbClr val="FFFFFF"/>
-          </a:solidFill>
-          <a:ln>
-            <a:noFill/>
-          </a:ln>
         </p:spPr>
-        <p:style>
-          <a:lnRef idx="2">
-            <a:schemeClr val="accent1">
-              <a:shade val="50000"/>
-            </a:schemeClr>
-          </a:lnRef>
-          <a:fillRef idx="1">
-            <a:schemeClr val="accent1"/>
-          </a:fillRef>
-          <a:effectRef idx="0">
-            <a:schemeClr val="accent1"/>
-          </a:effectRef>
-          <a:fontRef idx="minor">
-            <a:schemeClr val="lt1"/>
-          </a:fontRef>
-        </p:style>
         <p:txBody>
-          <a:bodyPr rtlCol="0" anchor="ctr"/>
+          <a:bodyPr/>
           <a:lstStyle/>
           <a:p>
-            <a:pPr algn="ctr"/>
-            <a:endParaRPr lang="en-US" dirty="0"/>
+            <a:r>
+              <a:rPr lang="it-IT" sz="6000" b="1" dirty="0"/>
+              <a:t>Definition of </a:t>
+            </a:r>
+            <a:r>
+              <a:rPr lang="it-IT" sz="6000" b="1" dirty="0" err="1"/>
+              <a:t>done</a:t>
+            </a:r>
+            <a:endParaRPr lang="it-IT" sz="6000" b="1" dirty="0"/>
           </a:p>
         </p:txBody>
       </p:sp>
-      <p:pic>
-        <p:nvPicPr>
-          <p:cNvPr id="3" name="Immagine 2">
+      <p:sp>
+        <p:nvSpPr>
+          <p:cNvPr id="3" name="Titolo 1">
             <a:extLst>
               <a:ext uri="{FF2B5EF4-FFF2-40B4-BE49-F238E27FC236}">
-                <a16:creationId xmlns:a16="http://schemas.microsoft.com/office/drawing/2014/main" id="{2AEB0895-4FBC-48B2-84CF-DFE12C5C6F5A}"/>
+                <a16:creationId xmlns:a16="http://schemas.microsoft.com/office/drawing/2014/main" id="{588EE772-9260-4483-B80F-CF998B08F83D}"/>
               </a:ext>
             </a:extLst>
           </p:cNvPr>
-          <p:cNvPicPr>
-            <a:picLocks noChangeAspect="1"/>
-          </p:cNvPicPr>
+          <p:cNvSpPr txBox="1">
+            <a:spLocks/>
+          </p:cNvSpPr>
           <p:nvPr/>
-        </p:nvPicPr>
-        <p:blipFill>
-          <a:blip r:embed="rId3"/>
-          <a:stretch>
-            <a:fillRect/>
-          </a:stretch>
-        </p:blipFill>
+        </p:nvSpPr>
         <p:spPr>
           <a:xfrm>
-            <a:off x="643467" y="1956816"/>
-            <a:ext cx="10905066" cy="2944368"/>
+            <a:off x="646111" y="1853248"/>
+            <a:ext cx="10157880" cy="3506543"/>
           </a:xfrm>
           <a:prstGeom prst="rect">
             <a:avLst/>
           </a:prstGeom>
         </p:spPr>
-      </p:pic>
-      <p:sp>
-        <p:nvSpPr>
-          <p:cNvPr id="10" name="Rectangle 9">
-            <a:extLst>
-              <a:ext uri="{FF2B5EF4-FFF2-40B4-BE49-F238E27FC236}">
-                <a16:creationId xmlns:a16="http://schemas.microsoft.com/office/drawing/2014/main" id="{9A6C928E-4252-4F33-8C34-E50A12A3170B}"/>
-              </a:ext>
-              <a:ext uri="{C183D7F6-B498-43B3-948B-1728B52AA6E4}">
-                <adec:decorative xmlns:adec="http://schemas.microsoft.com/office/drawing/2017/decorative" val="1"/>
-              </a:ext>
-            </a:extLst>
-          </p:cNvPr>
-          <p:cNvSpPr>
-            <a:spLocks noGrp="1" noRot="1" noChangeAspect="1" noMove="1" noResize="1" noEditPoints="1" noAdjustHandles="1" noChangeArrowheads="1" noChangeShapeType="1" noTextEdit="1"/>
-          </p:cNvSpPr>
-          <p:nvPr>
-            <p:extLst>
-              <p:ext uri="{386F3935-93C4-4BCD-93E2-E3B085C9AB24}">
-                <p16:designElem xmlns:p16="http://schemas.microsoft.com/office/powerpoint/2015/main" val="1"/>
-              </p:ext>
-            </p:extLst>
-          </p:nvPr>
-        </p:nvSpPr>
-        <p:spPr>
-          <a:xfrm>
-            <a:off x="10437812" y="0"/>
-            <a:ext cx="685800" cy="1143000"/>
-          </a:xfrm>
-          <a:prstGeom prst="rect">
-            <a:avLst/>
-          </a:prstGeom>
-          <a:solidFill>
-            <a:schemeClr val="accent1"/>
-          </a:solidFill>
-          <a:ln>
-            <a:noFill/>
-          </a:ln>
-        </p:spPr>
-        <p:style>
-          <a:lnRef idx="1">
-            <a:schemeClr val="accent1"/>
-          </a:lnRef>
-          <a:fillRef idx="3">
-            <a:schemeClr val="accent1"/>
-          </a:fillRef>
-          <a:effectRef idx="2">
-            <a:schemeClr val="accent1"/>
-          </a:effectRef>
-          <a:fontRef idx="minor">
-            <a:schemeClr val="lt1"/>
-          </a:fontRef>
-        </p:style>
+        <p:txBody>
+          <a:bodyPr vert="horz" lIns="91440" tIns="45720" rIns="91440" bIns="45720" rtlCol="0" anchor="t">
+            <a:noAutofit/>
+          </a:bodyPr>
+          <a:lstStyle>
+            <a:lvl1pPr algn="l" defTabSz="457200" rtl="0" eaLnBrk="1" latinLnBrk="0" hangingPunct="1">
+              <a:spcBef>
+                <a:spcPct val="0"/>
+              </a:spcBef>
+              <a:buNone/>
+              <a:defRPr sz="4200" b="0" i="0" kern="1200">
+                <a:solidFill>
+                  <a:schemeClr val="tx2"/>
+                </a:solidFill>
+                <a:latin typeface="+mj-lt"/>
+                <a:ea typeface="+mj-ea"/>
+                <a:cs typeface="+mj-cs"/>
+              </a:defRPr>
+            </a:lvl1pPr>
+            <a:lvl2pPr eaLnBrk="1" hangingPunct="1">
+              <a:defRPr>
+                <a:solidFill>
+                  <a:schemeClr val="tx2"/>
+                </a:solidFill>
+              </a:defRPr>
+            </a:lvl2pPr>
+            <a:lvl3pPr eaLnBrk="1" hangingPunct="1">
+              <a:defRPr>
+                <a:solidFill>
+                  <a:schemeClr val="tx2"/>
+                </a:solidFill>
+              </a:defRPr>
+            </a:lvl3pPr>
+            <a:lvl4pPr eaLnBrk="1" hangingPunct="1">
+              <a:defRPr>
+                <a:solidFill>
+                  <a:schemeClr val="tx2"/>
+                </a:solidFill>
+              </a:defRPr>
+            </a:lvl4pPr>
+            <a:lvl5pPr eaLnBrk="1" hangingPunct="1">
+              <a:defRPr>
+                <a:solidFill>
+                  <a:schemeClr val="tx2"/>
+                </a:solidFill>
+              </a:defRPr>
+            </a:lvl5pPr>
+            <a:lvl6pPr eaLnBrk="1" hangingPunct="1">
+              <a:defRPr>
+                <a:solidFill>
+                  <a:schemeClr val="tx2"/>
+                </a:solidFill>
+              </a:defRPr>
+            </a:lvl6pPr>
+            <a:lvl7pPr eaLnBrk="1" hangingPunct="1">
+              <a:defRPr>
+                <a:solidFill>
+                  <a:schemeClr val="tx2"/>
+                </a:solidFill>
+              </a:defRPr>
+            </a:lvl7pPr>
+            <a:lvl8pPr eaLnBrk="1" hangingPunct="1">
+              <a:defRPr>
+                <a:solidFill>
+                  <a:schemeClr val="tx2"/>
+                </a:solidFill>
+              </a:defRPr>
+            </a:lvl8pPr>
+            <a:lvl9pPr eaLnBrk="1" hangingPunct="1">
+              <a:defRPr>
+                <a:solidFill>
+                  <a:schemeClr val="tx2"/>
+                </a:solidFill>
+              </a:defRPr>
+            </a:lvl9pPr>
+          </a:lstStyle>
+          <a:p>
+            <a:pPr marL="571500" indent="-571500">
+              <a:buFont typeface="Arial" panose="020B0604020202020204" pitchFamily="34" charset="0"/>
+              <a:buChar char="•"/>
+            </a:pPr>
+            <a:r>
+              <a:rPr lang="it-IT" sz="3700" dirty="0">
+                <a:solidFill>
+                  <a:srgbClr val="FFC000"/>
+                </a:solidFill>
+              </a:rPr>
+              <a:t>Code review</a:t>
+            </a:r>
+          </a:p>
+          <a:p>
+            <a:pPr marL="571500" indent="-571500">
+              <a:buFont typeface="Arial" panose="020B0604020202020204" pitchFamily="34" charset="0"/>
+              <a:buChar char="•"/>
+            </a:pPr>
+            <a:r>
+              <a:rPr lang="it-IT" sz="3700" dirty="0">
+                <a:solidFill>
+                  <a:schemeClr val="accent1">
+                    <a:lumMod val="60000"/>
+                    <a:lumOff val="40000"/>
+                  </a:schemeClr>
+                </a:solidFill>
+              </a:rPr>
+              <a:t>Unit testing</a:t>
+            </a:r>
+          </a:p>
+          <a:p>
+            <a:pPr marL="571500" indent="-571500">
+              <a:buFont typeface="Arial" panose="020B0604020202020204" pitchFamily="34" charset="0"/>
+              <a:buChar char="•"/>
+            </a:pPr>
+            <a:r>
+              <a:rPr lang="it-IT" sz="3700" dirty="0">
+                <a:solidFill>
+                  <a:srgbClr val="92D050"/>
+                </a:solidFill>
+              </a:rPr>
+              <a:t>Performance testing</a:t>
+            </a:r>
+          </a:p>
+          <a:p>
+            <a:pPr marL="571500" indent="-571500">
+              <a:buFont typeface="Arial" panose="020B0604020202020204" pitchFamily="34" charset="0"/>
+              <a:buChar char="•"/>
+            </a:pPr>
+            <a:r>
+              <a:rPr lang="it-IT" sz="3700" dirty="0">
+                <a:solidFill>
+                  <a:srgbClr val="00B0F0"/>
+                </a:solidFill>
+              </a:rPr>
+              <a:t>E2E testing</a:t>
+            </a:r>
+          </a:p>
+          <a:p>
+            <a:pPr marL="571500" indent="-571500">
+              <a:buFont typeface="Arial" panose="020B0604020202020204" pitchFamily="34" charset="0"/>
+              <a:buChar char="•"/>
+            </a:pPr>
+            <a:r>
+              <a:rPr lang="it-IT" sz="3700" dirty="0">
+                <a:solidFill>
+                  <a:schemeClr val="bg2">
+                    <a:lumMod val="20000"/>
+                    <a:lumOff val="80000"/>
+                  </a:schemeClr>
+                </a:solidFill>
+              </a:rPr>
+              <a:t>Verification of </a:t>
+            </a:r>
+            <a:r>
+              <a:rPr lang="it-IT" sz="3700" dirty="0" err="1">
+                <a:solidFill>
+                  <a:schemeClr val="bg2">
+                    <a:lumMod val="20000"/>
+                    <a:lumOff val="80000"/>
+                  </a:schemeClr>
+                </a:solidFill>
+              </a:rPr>
+              <a:t>accessibility</a:t>
+            </a:r>
+            <a:endParaRPr lang="it-IT" sz="3700" dirty="0">
+              <a:solidFill>
+                <a:schemeClr val="bg2">
+                  <a:lumMod val="20000"/>
+                  <a:lumOff val="80000"/>
+                </a:schemeClr>
+              </a:solidFill>
+            </a:endParaRPr>
+          </a:p>
+        </p:txBody>
       </p:sp>
     </p:spTree>
     <p:extLst>
       <p:ext uri="{BB962C8B-B14F-4D97-AF65-F5344CB8AC3E}">
-        <p14:creationId xmlns:p14="http://schemas.microsoft.com/office/powerpoint/2010/main" val="3449580714"/>
+        <p14:creationId xmlns:p14="http://schemas.microsoft.com/office/powerpoint/2010/main" val="2160423048"/>
       </p:ext>
     </p:extLst>
   </p:cSld>
@@ -11982,7 +12107,7 @@
           <p:cNvPr id="3" name="Immagine 2">
             <a:extLst>
               <a:ext uri="{FF2B5EF4-FFF2-40B4-BE49-F238E27FC236}">
-                <a16:creationId xmlns:a16="http://schemas.microsoft.com/office/drawing/2014/main" id="{A3E59E00-A119-4E69-85C9-D826C2E26092}"/>
+                <a16:creationId xmlns:a16="http://schemas.microsoft.com/office/drawing/2014/main" id="{2AEB0895-4FBC-48B2-84CF-DFE12C5C6F5A}"/>
               </a:ext>
             </a:extLst>
           </p:cNvPr>
@@ -11999,8 +12124,8 @@
         </p:blipFill>
         <p:spPr>
           <a:xfrm>
-            <a:off x="643467" y="1261239"/>
-            <a:ext cx="10905066" cy="4362026"/>
+            <a:off x="643467" y="1956816"/>
+            <a:ext cx="10905066" cy="2944368"/>
           </a:xfrm>
           <a:prstGeom prst="rect">
             <a:avLst/>
@@ -12063,6 +12188,206 @@
     </p:spTree>
     <p:extLst>
       <p:ext uri="{BB962C8B-B14F-4D97-AF65-F5344CB8AC3E}">
+        <p14:creationId xmlns:p14="http://schemas.microsoft.com/office/powerpoint/2010/main" val="3449580714"/>
+      </p:ext>
+    </p:extLst>
+  </p:cSld>
+  <p:clrMapOvr>
+    <a:masterClrMapping/>
+  </p:clrMapOvr>
+</p:sld>
+</file>
+
+<file path=ppt/slides/slide6.xml><?xml version="1.0" encoding="utf-8"?>
+<p:sld xmlns:a="http://schemas.openxmlformats.org/drawingml/2006/main" xmlns:r="http://schemas.openxmlformats.org/officeDocument/2006/relationships" xmlns:p="http://schemas.openxmlformats.org/presentationml/2006/main">
+  <p:cSld>
+    <p:bg>
+      <p:bgPr>
+        <a:blipFill rotWithShape="1">
+          <a:blip r:embed="rId2">
+            <a:duotone>
+              <a:schemeClr val="bg2">
+                <a:shade val="69000"/>
+                <a:hueMod val="108000"/>
+                <a:satMod val="164000"/>
+                <a:lumMod val="74000"/>
+              </a:schemeClr>
+              <a:schemeClr val="bg2">
+                <a:tint val="96000"/>
+                <a:hueMod val="88000"/>
+                <a:satMod val="140000"/>
+                <a:lumMod val="132000"/>
+              </a:schemeClr>
+            </a:duotone>
+          </a:blip>
+          <a:stretch/>
+        </a:blipFill>
+        <a:effectLst/>
+      </p:bgPr>
+    </p:bg>
+    <p:spTree>
+      <p:nvGrpSpPr>
+        <p:cNvPr id="1" name=""/>
+        <p:cNvGrpSpPr/>
+        <p:nvPr/>
+      </p:nvGrpSpPr>
+      <p:grpSpPr>
+        <a:xfrm>
+          <a:off x="0" y="0"/>
+          <a:ext cx="0" cy="0"/>
+          <a:chOff x="0" y="0"/>
+          <a:chExt cx="0" cy="0"/>
+        </a:xfrm>
+      </p:grpSpPr>
+      <p:sp>
+        <p:nvSpPr>
+          <p:cNvPr id="8" name="Rectangle 7">
+            <a:extLst>
+              <a:ext uri="{FF2B5EF4-FFF2-40B4-BE49-F238E27FC236}">
+                <a16:creationId xmlns:a16="http://schemas.microsoft.com/office/drawing/2014/main" id="{DFB3CEA1-88D9-42FB-88ED-1E9807FE6596}"/>
+              </a:ext>
+              <a:ext uri="{C183D7F6-B498-43B3-948B-1728B52AA6E4}">
+                <adec:decorative xmlns:adec="http://schemas.microsoft.com/office/drawing/2017/decorative" val="1"/>
+              </a:ext>
+            </a:extLst>
+          </p:cNvPr>
+          <p:cNvSpPr>
+            <a:spLocks noGrp="1" noRot="1" noChangeAspect="1" noMove="1" noResize="1" noEditPoints="1" noAdjustHandles="1" noChangeArrowheads="1" noChangeShapeType="1" noTextEdit="1"/>
+          </p:cNvSpPr>
+          <p:nvPr>
+            <p:extLst>
+              <p:ext uri="{386F3935-93C4-4BCD-93E2-E3B085C9AB24}">
+                <p16:designElem xmlns:p16="http://schemas.microsoft.com/office/powerpoint/2015/main" val="1"/>
+              </p:ext>
+            </p:extLst>
+          </p:nvPr>
+        </p:nvSpPr>
+        <p:spPr>
+          <a:xfrm>
+            <a:off x="477012" y="480060"/>
+            <a:ext cx="11237976" cy="5897880"/>
+          </a:xfrm>
+          <a:prstGeom prst="rect">
+            <a:avLst/>
+          </a:prstGeom>
+          <a:solidFill>
+            <a:srgbClr val="FFFFFF"/>
+          </a:solidFill>
+          <a:ln>
+            <a:noFill/>
+          </a:ln>
+        </p:spPr>
+        <p:style>
+          <a:lnRef idx="2">
+            <a:schemeClr val="accent1">
+              <a:shade val="50000"/>
+            </a:schemeClr>
+          </a:lnRef>
+          <a:fillRef idx="1">
+            <a:schemeClr val="accent1"/>
+          </a:fillRef>
+          <a:effectRef idx="0">
+            <a:schemeClr val="accent1"/>
+          </a:effectRef>
+          <a:fontRef idx="minor">
+            <a:schemeClr val="lt1"/>
+          </a:fontRef>
+        </p:style>
+        <p:txBody>
+          <a:bodyPr rtlCol="0" anchor="ctr"/>
+          <a:lstStyle/>
+          <a:p>
+            <a:pPr algn="ctr"/>
+            <a:endParaRPr lang="en-US" dirty="0"/>
+          </a:p>
+        </p:txBody>
+      </p:sp>
+      <p:pic>
+        <p:nvPicPr>
+          <p:cNvPr id="3" name="Immagine 2">
+            <a:extLst>
+              <a:ext uri="{FF2B5EF4-FFF2-40B4-BE49-F238E27FC236}">
+                <a16:creationId xmlns:a16="http://schemas.microsoft.com/office/drawing/2014/main" id="{A3E59E00-A119-4E69-85C9-D826C2E26092}"/>
+              </a:ext>
+            </a:extLst>
+          </p:cNvPr>
+          <p:cNvPicPr>
+            <a:picLocks noChangeAspect="1"/>
+          </p:cNvPicPr>
+          <p:nvPr/>
+        </p:nvPicPr>
+        <p:blipFill>
+          <a:blip r:embed="rId3"/>
+          <a:stretch>
+            <a:fillRect/>
+          </a:stretch>
+        </p:blipFill>
+        <p:spPr>
+          <a:xfrm>
+            <a:off x="643467" y="1261239"/>
+            <a:ext cx="10905066" cy="4362026"/>
+          </a:xfrm>
+          <a:prstGeom prst="rect">
+            <a:avLst/>
+          </a:prstGeom>
+        </p:spPr>
+      </p:pic>
+      <p:sp>
+        <p:nvSpPr>
+          <p:cNvPr id="10" name="Rectangle 9">
+            <a:extLst>
+              <a:ext uri="{FF2B5EF4-FFF2-40B4-BE49-F238E27FC236}">
+                <a16:creationId xmlns:a16="http://schemas.microsoft.com/office/drawing/2014/main" id="{9A6C928E-4252-4F33-8C34-E50A12A3170B}"/>
+              </a:ext>
+              <a:ext uri="{C183D7F6-B498-43B3-948B-1728B52AA6E4}">
+                <adec:decorative xmlns:adec="http://schemas.microsoft.com/office/drawing/2017/decorative" val="1"/>
+              </a:ext>
+            </a:extLst>
+          </p:cNvPr>
+          <p:cNvSpPr>
+            <a:spLocks noGrp="1" noRot="1" noChangeAspect="1" noMove="1" noResize="1" noEditPoints="1" noAdjustHandles="1" noChangeArrowheads="1" noChangeShapeType="1" noTextEdit="1"/>
+          </p:cNvSpPr>
+          <p:nvPr>
+            <p:extLst>
+              <p:ext uri="{386F3935-93C4-4BCD-93E2-E3B085C9AB24}">
+                <p16:designElem xmlns:p16="http://schemas.microsoft.com/office/powerpoint/2015/main" val="1"/>
+              </p:ext>
+            </p:extLst>
+          </p:nvPr>
+        </p:nvSpPr>
+        <p:spPr>
+          <a:xfrm>
+            <a:off x="10437812" y="0"/>
+            <a:ext cx="685800" cy="1143000"/>
+          </a:xfrm>
+          <a:prstGeom prst="rect">
+            <a:avLst/>
+          </a:prstGeom>
+          <a:solidFill>
+            <a:schemeClr val="accent1"/>
+          </a:solidFill>
+          <a:ln>
+            <a:noFill/>
+          </a:ln>
+        </p:spPr>
+        <p:style>
+          <a:lnRef idx="1">
+            <a:schemeClr val="accent1"/>
+          </a:lnRef>
+          <a:fillRef idx="3">
+            <a:schemeClr val="accent1"/>
+          </a:fillRef>
+          <a:effectRef idx="2">
+            <a:schemeClr val="accent1"/>
+          </a:effectRef>
+          <a:fontRef idx="minor">
+            <a:schemeClr val="lt1"/>
+          </a:fontRef>
+        </p:style>
+      </p:sp>
+    </p:spTree>
+    <p:extLst>
+      <p:ext uri="{BB962C8B-B14F-4D97-AF65-F5344CB8AC3E}">
         <p14:creationId xmlns:p14="http://schemas.microsoft.com/office/powerpoint/2010/main" val="3457238236"/>
       </p:ext>
     </p:extLst>
@@ -12073,7 +12398,7 @@
 </p:sld>
 </file>
 
-<file path=ppt/slides/slide6.xml><?xml version="1.0" encoding="utf-8"?>
+<file path=ppt/slides/slide7.xml><?xml version="1.0" encoding="utf-8"?>
 <p:sld xmlns:a="http://schemas.openxmlformats.org/drawingml/2006/main" xmlns:r="http://schemas.openxmlformats.org/officeDocument/2006/relationships" xmlns:p="http://schemas.openxmlformats.org/presentationml/2006/main">
   <p:cSld>
     <p:spTree>
@@ -12133,7 +12458,7 @@
 </p:sld>
 </file>
 
-<file path=ppt/slides/slide7.xml><?xml version="1.0" encoding="utf-8"?>
+<file path=ppt/slides/slide8.xml><?xml version="1.0" encoding="utf-8"?>
 <p:sld xmlns:a="http://schemas.openxmlformats.org/drawingml/2006/main" xmlns:r="http://schemas.openxmlformats.org/officeDocument/2006/relationships" xmlns:p="http://schemas.openxmlformats.org/presentationml/2006/main">
   <p:cSld>
     <p:spTree>
@@ -12193,7 +12518,7 @@
 </p:sld>
 </file>
 
-<file path=ppt/slides/slide8.xml><?xml version="1.0" encoding="utf-8"?>
+<file path=ppt/slides/slide9.xml><?xml version="1.0" encoding="utf-8"?>
 <p:sld xmlns:a="http://schemas.openxmlformats.org/drawingml/2006/main" xmlns:r="http://schemas.openxmlformats.org/officeDocument/2006/relationships" xmlns:p="http://schemas.openxmlformats.org/presentationml/2006/main">
   <p:cSld>
     <p:spTree>
@@ -12244,66 +12569,6 @@
     <p:extLst>
       <p:ext uri="{BB962C8B-B14F-4D97-AF65-F5344CB8AC3E}">
         <p14:creationId xmlns:p14="http://schemas.microsoft.com/office/powerpoint/2010/main" val="260892973"/>
-      </p:ext>
-    </p:extLst>
-  </p:cSld>
-  <p:clrMapOvr>
-    <a:masterClrMapping/>
-  </p:clrMapOvr>
-</p:sld>
-</file>
-
-<file path=ppt/slides/slide9.xml><?xml version="1.0" encoding="utf-8"?>
-<p:sld xmlns:a="http://schemas.openxmlformats.org/drawingml/2006/main" xmlns:r="http://schemas.openxmlformats.org/officeDocument/2006/relationships" xmlns:p="http://schemas.openxmlformats.org/presentationml/2006/main">
-  <p:cSld>
-    <p:spTree>
-      <p:nvGrpSpPr>
-        <p:cNvPr id="1" name=""/>
-        <p:cNvGrpSpPr/>
-        <p:nvPr/>
-      </p:nvGrpSpPr>
-      <p:grpSpPr>
-        <a:xfrm>
-          <a:off x="0" y="0"/>
-          <a:ext cx="0" cy="0"/>
-          <a:chOff x="0" y="0"/>
-          <a:chExt cx="0" cy="0"/>
-        </a:xfrm>
-      </p:grpSpPr>
-      <p:pic>
-        <p:nvPicPr>
-          <p:cNvPr id="3" name="Immagine 2">
-            <a:extLst>
-              <a:ext uri="{FF2B5EF4-FFF2-40B4-BE49-F238E27FC236}">
-                <a16:creationId xmlns:a16="http://schemas.microsoft.com/office/drawing/2014/main" id="{1DAF4443-9696-41FF-9D84-4079CFCEFB3B}"/>
-              </a:ext>
-            </a:extLst>
-          </p:cNvPr>
-          <p:cNvPicPr>
-            <a:picLocks noChangeAspect="1"/>
-          </p:cNvPicPr>
-          <p:nvPr/>
-        </p:nvPicPr>
-        <p:blipFill>
-          <a:blip r:embed="rId2"/>
-          <a:stretch>
-            <a:fillRect/>
-          </a:stretch>
-        </p:blipFill>
-        <p:spPr>
-          <a:xfrm>
-            <a:off x="845533" y="2250458"/>
-            <a:ext cx="10500934" cy="2357083"/>
-          </a:xfrm>
-          <a:prstGeom prst="rect">
-            <a:avLst/>
-          </a:prstGeom>
-        </p:spPr>
-      </p:pic>
-    </p:spTree>
-    <p:extLst>
-      <p:ext uri="{BB962C8B-B14F-4D97-AF65-F5344CB8AC3E}">
-        <p14:creationId xmlns:p14="http://schemas.microsoft.com/office/powerpoint/2010/main" val="515914171"/>
       </p:ext>
     </p:extLst>
   </p:cSld>

</xml_diff>